<commit_message>
Final(?) version the PPT (fixed Samuele's role)
</commit_message>
<xml_diff>
--- a/Pentominoes.pptx
+++ b/Pentominoes.pptx
@@ -14165,8 +14165,8 @@
               <a:t>: </a:t>
             </a:r>
             <a:r>
-              <a:rPr lang="en-US" sz="2600" b="1" dirty="0"/>
-              <a:t>Executive delivery boy</a:t>
+              <a:rPr lang="en-US" sz="2600" b="1"/>
+              <a:t>Coding assistant</a:t>
             </a:r>
             <a:endParaRPr lang="en-US" sz="2600" dirty="0"/>
           </a:p>

</xml_diff>

<commit_message>
Final(?) version of the PPT (fixed Samuele's role and the description of AlgX)
</commit_message>
<xml_diff>
--- a/Pentominoes.pptx
+++ b/Pentominoes.pptx
@@ -14165,7 +14165,7 @@
               <a:t>: </a:t>
             </a:r>
             <a:r>
-              <a:rPr lang="en-US" sz="2600" b="1"/>
+              <a:rPr lang="en-US" sz="2600" b="1" dirty="0"/>
               <a:t>Coding assistant</a:t>
             </a:r>
             <a:endParaRPr lang="en-US" sz="2600" dirty="0"/>
@@ -15403,7 +15403,7 @@
         <p:spPr>
           <a:xfrm>
             <a:off x="257911" y="2057129"/>
-            <a:ext cx="11336213" cy="3346109"/>
+            <a:ext cx="11336213" cy="2238113"/>
           </a:xfrm>
           <a:prstGeom prst="rect">
             <a:avLst/>
@@ -15431,16 +15431,9 @@
               <a:rPr lang="en-US" sz="2400" dirty="0"/>
             </a:br>
             <a:r>
-              <a:rPr lang="en-US" sz="2400" dirty="0"/>
-              <a:t>Algorithm X determines the position of the next pentomino to be placed by creating a matrix and deleting rows and columns until it finds a valid solution (or not).</a:t>
-            </a:r>
-          </a:p>
-          <a:p>
-            <a:pPr>
-              <a:lnSpc>
-                <a:spcPct val="150000"/>
-              </a:lnSpc>
-            </a:pPr>
+              <a:rPr lang="en-US" sz="2400"/>
+              <a:t>Algorithm X determines all solutions to the problem by creating a matrix and deleting rows and columns until it finds a valid solution (or not).</a:t>
+            </a:r>
             <a:endParaRPr lang="en-US" sz="2400" dirty="0"/>
           </a:p>
           <a:p>

</xml_diff>